<commit_message>
BANYAK STRUKTUR YANG BERUBAH!!!!!!!!!
</commit_message>
<xml_diff>
--- a/Arsitektur Sistem Aplikasi Chat.pptx
+++ b/Arsitektur Sistem Aplikasi Chat.pptx
@@ -6607,8 +6607,17 @@
             </a:r>
             <a:r>
               <a:rPr lang="id-ID" dirty="0" smtClean="0"/>
+              <a:t>};{</a:t>
+            </a:r>
+            <a:r>
+              <a:rPr lang="id-ID" dirty="0" err="1" smtClean="0"/>
+              <a:t>name</a:t>
+            </a:r>
+            <a:r>
+              <a:rPr lang="id-ID" smtClean="0"/>
               <a:t>}</a:t>
             </a:r>
+            <a:endParaRPr lang="id-ID" dirty="0" smtClean="0"/>
           </a:p>
           <a:p>
             <a:pPr lvl="2"/>
@@ -15642,11 +15651,7 @@
             </a:r>
             <a:r>
               <a:rPr lang="id-ID" dirty="0"/>
-              <a:t>};{nama</a:t>
-            </a:r>
-            <a:r>
-              <a:rPr lang="id-ID" dirty="0"/>
-              <a:t>}; {id_1};{id_2}:..:{</a:t>
+              <a:t>};{nama}; {id_1};{id_2}:..:{</a:t>
             </a:r>
             <a:r>
               <a:rPr lang="id-ID" dirty="0" err="1"/>

</xml_diff>

<commit_message>
udah bisa multi server sama multi chat
</commit_message>
<xml_diff>
--- a/Arsitektur Sistem Aplikasi Chat.pptx
+++ b/Arsitektur Sistem Aplikasi Chat.pptx
@@ -381,7 +381,7 @@
             <a:fld id="{B61BEF0D-F0BB-DE4B-95CE-6DB70DBA9567}" type="datetimeFigureOut">
               <a:rPr lang="en-US" dirty="0"/>
               <a:pPr/>
-              <a:t>11/6/2016</a:t>
+              <a:t>11/7/2016</a:t>
             </a:fld>
             <a:endParaRPr lang="en-US" dirty="0"/>
           </a:p>
@@ -712,7 +712,7 @@
             <a:fld id="{B61BEF0D-F0BB-DE4B-95CE-6DB70DBA9567}" type="datetimeFigureOut">
               <a:rPr lang="en-US" dirty="0"/>
               <a:pPr/>
-              <a:t>11/6/2016</a:t>
+              <a:t>11/7/2016</a:t>
             </a:fld>
             <a:endParaRPr lang="en-US" dirty="0"/>
           </a:p>
@@ -987,7 +987,7 @@
             <a:fld id="{B61BEF0D-F0BB-DE4B-95CE-6DB70DBA9567}" type="datetimeFigureOut">
               <a:rPr lang="en-US" dirty="0"/>
               <a:pPr/>
-              <a:t>11/6/2016</a:t>
+              <a:t>11/7/2016</a:t>
             </a:fld>
             <a:endParaRPr lang="en-US" dirty="0"/>
           </a:p>
@@ -1552,7 +1552,7 @@
             <a:fld id="{B61BEF0D-F0BB-DE4B-95CE-6DB70DBA9567}" type="datetimeFigureOut">
               <a:rPr lang="en-US" dirty="0"/>
               <a:pPr/>
-              <a:t>11/6/2016</a:t>
+              <a:t>11/7/2016</a:t>
             </a:fld>
             <a:endParaRPr lang="en-US" dirty="0"/>
           </a:p>
@@ -1827,7 +1827,7 @@
             <a:fld id="{B61BEF0D-F0BB-DE4B-95CE-6DB70DBA9567}" type="datetimeFigureOut">
               <a:rPr lang="en-US" dirty="0"/>
               <a:pPr/>
-              <a:t>11/6/2016</a:t>
+              <a:t>11/7/2016</a:t>
             </a:fld>
             <a:endParaRPr lang="en-US" dirty="0"/>
           </a:p>
@@ -2386,7 +2386,7 @@
             <a:fld id="{B61BEF0D-F0BB-DE4B-95CE-6DB70DBA9567}" type="datetimeFigureOut">
               <a:rPr lang="en-US" dirty="0"/>
               <a:pPr/>
-              <a:t>11/6/2016</a:t>
+              <a:t>11/7/2016</a:t>
             </a:fld>
             <a:endParaRPr lang="en-US" dirty="0"/>
           </a:p>
@@ -2710,7 +2710,7 @@
             <a:fld id="{B61BEF0D-F0BB-DE4B-95CE-6DB70DBA9567}" type="datetimeFigureOut">
               <a:rPr lang="en-US" dirty="0"/>
               <a:pPr/>
-              <a:t>11/6/2016</a:t>
+              <a:t>11/7/2016</a:t>
             </a:fld>
             <a:endParaRPr lang="en-US" dirty="0"/>
           </a:p>
@@ -2884,7 +2884,7 @@
             <a:fld id="{B61BEF0D-F0BB-DE4B-95CE-6DB70DBA9567}" type="datetimeFigureOut">
               <a:rPr lang="en-US" dirty="0"/>
               <a:pPr/>
-              <a:t>11/6/2016</a:t>
+              <a:t>11/7/2016</a:t>
             </a:fld>
             <a:endParaRPr lang="en-US" dirty="0"/>
           </a:p>
@@ -3119,7 +3119,7 @@
             <a:fld id="{B61BEF0D-F0BB-DE4B-95CE-6DB70DBA9567}" type="datetimeFigureOut">
               <a:rPr lang="en-US" dirty="0"/>
               <a:pPr/>
-              <a:t>11/6/2016</a:t>
+              <a:t>11/7/2016</a:t>
             </a:fld>
             <a:endParaRPr lang="en-US" dirty="0"/>
           </a:p>
@@ -3316,7 +3316,7 @@
             <a:fld id="{B61BEF0D-F0BB-DE4B-95CE-6DB70DBA9567}" type="datetimeFigureOut">
               <a:rPr lang="en-US" dirty="0"/>
               <a:pPr/>
-              <a:t>11/6/2016</a:t>
+              <a:t>11/7/2016</a:t>
             </a:fld>
             <a:endParaRPr lang="en-US" dirty="0"/>
           </a:p>
@@ -3589,7 +3589,7 @@
             <a:fld id="{B61BEF0D-F0BB-DE4B-95CE-6DB70DBA9567}" type="datetimeFigureOut">
               <a:rPr lang="en-US" dirty="0"/>
               <a:pPr/>
-              <a:t>11/6/2016</a:t>
+              <a:t>11/7/2016</a:t>
             </a:fld>
             <a:endParaRPr lang="en-US" dirty="0"/>
           </a:p>
@@ -3852,7 +3852,7 @@
             <a:fld id="{B61BEF0D-F0BB-DE4B-95CE-6DB70DBA9567}" type="datetimeFigureOut">
               <a:rPr lang="en-US" dirty="0"/>
               <a:pPr/>
-              <a:t>11/6/2016</a:t>
+              <a:t>11/7/2016</a:t>
             </a:fld>
             <a:endParaRPr lang="en-US" dirty="0"/>
           </a:p>
@@ -4223,7 +4223,7 @@
             <a:fld id="{B61BEF0D-F0BB-DE4B-95CE-6DB70DBA9567}" type="datetimeFigureOut">
               <a:rPr lang="en-US" dirty="0"/>
               <a:pPr/>
-              <a:t>11/6/2016</a:t>
+              <a:t>11/7/2016</a:t>
             </a:fld>
             <a:endParaRPr lang="en-US" dirty="0"/>
           </a:p>
@@ -4368,7 +4368,7 @@
             <a:fld id="{B61BEF0D-F0BB-DE4B-95CE-6DB70DBA9567}" type="datetimeFigureOut">
               <a:rPr lang="en-US" dirty="0"/>
               <a:pPr/>
-              <a:t>11/6/2016</a:t>
+              <a:t>11/7/2016</a:t>
             </a:fld>
             <a:endParaRPr lang="en-US" dirty="0"/>
           </a:p>
@@ -4490,7 +4490,7 @@
             <a:fld id="{B61BEF0D-F0BB-DE4B-95CE-6DB70DBA9567}" type="datetimeFigureOut">
               <a:rPr lang="en-US" dirty="0"/>
               <a:pPr/>
-              <a:t>11/6/2016</a:t>
+              <a:t>11/7/2016</a:t>
             </a:fld>
             <a:endParaRPr lang="en-US" dirty="0"/>
           </a:p>
@@ -4772,7 +4772,7 @@
             <a:fld id="{B61BEF0D-F0BB-DE4B-95CE-6DB70DBA9567}" type="datetimeFigureOut">
               <a:rPr lang="en-US" dirty="0"/>
               <a:pPr/>
-              <a:t>11/6/2016</a:t>
+              <a:t>11/7/2016</a:t>
             </a:fld>
             <a:endParaRPr lang="en-US" dirty="0"/>
           </a:p>
@@ -5093,7 +5093,7 @@
             <a:fld id="{B61BEF0D-F0BB-DE4B-95CE-6DB70DBA9567}" type="datetimeFigureOut">
               <a:rPr lang="en-US" dirty="0"/>
               <a:pPr/>
-              <a:t>11/6/2016</a:t>
+              <a:t>11/7/2016</a:t>
             </a:fld>
             <a:endParaRPr lang="en-US" dirty="0"/>
           </a:p>
@@ -5304,7 +5304,7 @@
             <a:fld id="{B61BEF0D-F0BB-DE4B-95CE-6DB70DBA9567}" type="datetimeFigureOut">
               <a:rPr lang="en-US" dirty="0"/>
               <a:pPr/>
-              <a:t>11/6/2016</a:t>
+              <a:t>11/7/2016</a:t>
             </a:fld>
             <a:endParaRPr lang="en-US" dirty="0"/>
           </a:p>
@@ -6569,7 +6569,6 @@
               <a:rPr lang="id-ID" dirty="0" smtClean="0"/>
               <a:t>}</a:t>
             </a:r>
-            <a:endParaRPr lang="id-ID" dirty="0" smtClean="0"/>
           </a:p>
           <a:p>
             <a:pPr lvl="2"/>
@@ -6645,7 +6644,6 @@
               <a:rPr lang="id-ID" dirty="0" smtClean="0"/>
               <a:t>};{nama}</a:t>
             </a:r>
-            <a:endParaRPr lang="id-ID" dirty="0" smtClean="0"/>
           </a:p>
           <a:p>
             <a:pPr lvl="2"/>
@@ -9978,7 +9976,7 @@
               <a:buNone/>
             </a:pPr>
             <a:r>
-              <a:rPr lang="id-ID" smtClean="0"/>
+              <a:rPr lang="id-ID" dirty="0" smtClean="0"/>
               <a:t>start;</a:t>
             </a:r>
           </a:p>
@@ -9988,7 +9986,7 @@
               <a:buNone/>
             </a:pPr>
             <a:r>
-              <a:rPr lang="id-ID" smtClean="0"/>
+              <a:rPr lang="id-ID" dirty="0" smtClean="0"/>
               <a:t>Membuka informasi paket yang diterima;</a:t>
             </a:r>
           </a:p>
@@ -9998,8 +9996,36 @@
               <a:buNone/>
             </a:pPr>
             <a:r>
-              <a:rPr lang="id-ID" smtClean="0"/>
-              <a:t>if(Chatnya merupakan chat group){</a:t>
+              <a:rPr lang="id-ID" dirty="0" err="1" smtClean="0"/>
+              <a:t>if</a:t>
+            </a:r>
+            <a:r>
+              <a:rPr lang="id-ID" dirty="0" smtClean="0"/>
+              <a:t>(</a:t>
+            </a:r>
+            <a:r>
+              <a:rPr lang="id-ID" dirty="0" err="1" smtClean="0"/>
+              <a:t>Chatnya</a:t>
+            </a:r>
+            <a:r>
+              <a:rPr lang="id-ID" dirty="0" smtClean="0"/>
+              <a:t> merupakan </a:t>
+            </a:r>
+            <a:r>
+              <a:rPr lang="id-ID" dirty="0" err="1" smtClean="0"/>
+              <a:t>chat</a:t>
+            </a:r>
+            <a:r>
+              <a:rPr lang="id-ID" dirty="0" smtClean="0"/>
+              <a:t> </a:t>
+            </a:r>
+            <a:r>
+              <a:rPr lang="id-ID" dirty="0" err="1" smtClean="0"/>
+              <a:t>group</a:t>
+            </a:r>
+            <a:r>
+              <a:rPr lang="id-ID" dirty="0" smtClean="0"/>
+              <a:t>){</a:t>
             </a:r>
           </a:p>
           <a:p>
@@ -10008,8 +10034,24 @@
               <a:buNone/>
             </a:pPr>
             <a:r>
-              <a:rPr lang="id-ID" smtClean="0"/>
-              <a:t>  memasukkan data-data dalam paket ke tabel Chat_Group pada database;</a:t>
+              <a:rPr lang="id-ID" dirty="0" smtClean="0"/>
+              <a:t>  memasukkan data-data dalam paket ke tabel </a:t>
+            </a:r>
+            <a:r>
+              <a:rPr lang="id-ID" dirty="0" err="1" smtClean="0"/>
+              <a:t>Chat_Group</a:t>
+            </a:r>
+            <a:r>
+              <a:rPr lang="id-ID" dirty="0" smtClean="0"/>
+              <a:t> pada </a:t>
+            </a:r>
+            <a:r>
+              <a:rPr lang="id-ID" dirty="0" err="1" smtClean="0"/>
+              <a:t>database</a:t>
+            </a:r>
+            <a:r>
+              <a:rPr lang="id-ID" dirty="0" smtClean="0"/>
+              <a:t>;</a:t>
             </a:r>
           </a:p>
           <a:p>
@@ -10018,8 +10060,24 @@
               <a:buNone/>
             </a:pPr>
             <a:r>
-              <a:rPr lang="id-ID" smtClean="0"/>
-              <a:t>  mengirimkan pesan pada client yang terhubung, online dan termasuk dalam anggota grup;</a:t>
+              <a:rPr lang="id-ID" dirty="0" smtClean="0"/>
+              <a:t>  mengirimkan pesan pada </a:t>
+            </a:r>
+            <a:r>
+              <a:rPr lang="id-ID" dirty="0" err="1" smtClean="0"/>
+              <a:t>client</a:t>
+            </a:r>
+            <a:r>
+              <a:rPr lang="id-ID" dirty="0" smtClean="0"/>
+              <a:t> yang terhubung, </a:t>
+            </a:r>
+            <a:r>
+              <a:rPr lang="id-ID" dirty="0" err="1" smtClean="0"/>
+              <a:t>online</a:t>
+            </a:r>
+            <a:r>
+              <a:rPr lang="id-ID" dirty="0" smtClean="0"/>
+              <a:t> dan termasuk dalam anggota grup;</a:t>
             </a:r>
           </a:p>
           <a:p>
@@ -10028,8 +10086,24 @@
               <a:buNone/>
             </a:pPr>
             <a:r>
-              <a:rPr lang="id-ID" smtClean="0"/>
-              <a:t>  if(paket diterima dari client){</a:t>
+              <a:rPr lang="id-ID" dirty="0" smtClean="0"/>
+              <a:t>  </a:t>
+            </a:r>
+            <a:r>
+              <a:rPr lang="id-ID" dirty="0" err="1" smtClean="0"/>
+              <a:t>if</a:t>
+            </a:r>
+            <a:r>
+              <a:rPr lang="id-ID" dirty="0" smtClean="0"/>
+              <a:t>(paket diterima dari </a:t>
+            </a:r>
+            <a:r>
+              <a:rPr lang="id-ID" dirty="0" err="1" smtClean="0"/>
+              <a:t>client</a:t>
+            </a:r>
+            <a:r>
+              <a:rPr lang="id-ID" dirty="0" smtClean="0"/>
+              <a:t>){</a:t>
             </a:r>
           </a:p>
           <a:p>
@@ -10038,8 +10112,16 @@
               <a:buNone/>
             </a:pPr>
             <a:r>
-              <a:rPr lang="id-ID" smtClean="0"/>
-              <a:t>    kirim ke server lainnya;</a:t>
+              <a:rPr lang="id-ID" dirty="0" smtClean="0"/>
+              <a:t>    kirim ke </a:t>
+            </a:r>
+            <a:r>
+              <a:rPr lang="id-ID" dirty="0" err="1" smtClean="0"/>
+              <a:t>server</a:t>
+            </a:r>
+            <a:r>
+              <a:rPr lang="id-ID" dirty="0" smtClean="0"/>
+              <a:t> lainnya;</a:t>
             </a:r>
           </a:p>
           <a:p>
@@ -10048,7 +10130,7 @@
               <a:buNone/>
             </a:pPr>
             <a:r>
-              <a:rPr lang="id-ID" smtClean="0"/>
+              <a:rPr lang="id-ID" dirty="0" smtClean="0"/>
               <a:t>  }</a:t>
             </a:r>
           </a:p>
@@ -10058,7 +10140,7 @@
               <a:buNone/>
             </a:pPr>
             <a:r>
-              <a:rPr lang="id-ID" smtClean="0"/>
+              <a:rPr lang="id-ID" dirty="0" smtClean="0"/>
               <a:t>}</a:t>
             </a:r>
             <a:endParaRPr lang="id-ID" dirty="0"/>
@@ -15814,7 +15896,6 @@
               <a:rPr lang="id-ID" dirty="0" smtClean="0"/>
               <a:t>}</a:t>
             </a:r>
-            <a:endParaRPr lang="id-ID" dirty="0" smtClean="0"/>
           </a:p>
           <a:p>
             <a:pPr lvl="3"/>

</xml_diff>